<commit_message>
Add a terminal screenshot
</commit_message>
<xml_diff>
--- a/slides/intermediate_python.pptx
+++ b/slides/intermediate_python.pptx
@@ -16536,7 +16536,7 @@
           <p:nvPr>
             <p:extLst>
               <p:ext uri="{D42A27DB-BD31-4B8C-83A1-F6EECF244321}">
-                <p14:modId xmlns:p14="http://schemas.microsoft.com/office/powerpoint/2010/main" val="2893638917"/>
+                <p14:modId xmlns:p14="http://schemas.microsoft.com/office/powerpoint/2010/main" val="3676992032"/>
               </p:ext>
             </p:extLst>
           </p:nvPr>
@@ -16548,7 +16548,9 @@
         <a:graphic>
           <a:graphicData uri="http://schemas.openxmlformats.org/drawingml/2006/table">
             <a:tbl>
-              <a:tblPr/>
+              <a:tblPr>
+                <a:tableStyleId>{5940675A-B579-460E-94D1-54222C63F5DA}</a:tableStyleId>
+              </a:tblPr>
               <a:tblGrid>
                 <a:gridCol w="1193181">
                   <a:extLst>
@@ -16573,31 +16575,24 @@
                     <a:p>
                       <a:pPr algn="l" fontAlgn="b"/>
                       <a:r>
-                        <a:rPr lang="en-GB" sz="1400" b="0" i="0" u="none" strike="noStrike">
+                        <a:rPr lang="en-GB" sz="1400" b="0" u="none" strike="noStrike">
                           <a:solidFill>
                             <a:srgbClr val="000000"/>
                           </a:solidFill>
                           <a:effectLst/>
-                          <a:latin typeface="Calibri" panose="020F0502020204030204" pitchFamily="34" charset="0"/>
                         </a:rPr>
                         <a:t>x_axis</a:t>
                       </a:r>
+                      <a:endParaRPr lang="en-GB" sz="1400" b="0" i="0" u="none" strike="noStrike">
+                        <a:solidFill>
+                          <a:srgbClr val="000000"/>
+                        </a:solidFill>
+                        <a:effectLst/>
+                        <a:latin typeface="Calibri" panose="020F0502020204030204" pitchFamily="34" charset="0"/>
+                      </a:endParaRPr>
                     </a:p>
                   </a:txBody>
-                  <a:tcPr marL="9359" marR="9359" marT="9359" marB="0" anchor="b">
-                    <a:lnL>
-                      <a:noFill/>
-                    </a:lnL>
-                    <a:lnR>
-                      <a:noFill/>
-                    </a:lnR>
-                    <a:lnT>
-                      <a:noFill/>
-                    </a:lnT>
-                    <a:lnB>
-                      <a:noFill/>
-                    </a:lnB>
-                  </a:tcPr>
+                  <a:tcPr marL="9359" marR="9359" marT="9359" marB="0" anchor="b"/>
                 </a:tc>
                 <a:tc>
                   <a:txBody>
@@ -16606,31 +16601,24 @@
                     <a:p>
                       <a:pPr algn="l" fontAlgn="b"/>
                       <a:r>
-                        <a:rPr lang="en-GB" sz="1400" b="0" i="0" u="none" strike="noStrike">
+                        <a:rPr lang="en-GB" sz="1400" b="0" u="none" strike="noStrike">
                           <a:solidFill>
                             <a:srgbClr val="000000"/>
                           </a:solidFill>
                           <a:effectLst/>
-                          <a:latin typeface="Calibri" panose="020F0502020204030204" pitchFamily="34" charset="0"/>
                         </a:rPr>
                         <a:t>y_axis</a:t>
                       </a:r>
+                      <a:endParaRPr lang="en-GB" sz="1400" b="0" i="0" u="none" strike="noStrike">
+                        <a:solidFill>
+                          <a:srgbClr val="000000"/>
+                        </a:solidFill>
+                        <a:effectLst/>
+                        <a:latin typeface="Calibri" panose="020F0502020204030204" pitchFamily="34" charset="0"/>
+                      </a:endParaRPr>
                     </a:p>
                   </a:txBody>
-                  <a:tcPr marL="9359" marR="9359" marT="9359" marB="0" anchor="b">
-                    <a:lnL>
-                      <a:noFill/>
-                    </a:lnL>
-                    <a:lnR>
-                      <a:noFill/>
-                    </a:lnR>
-                    <a:lnT>
-                      <a:noFill/>
-                    </a:lnT>
-                    <a:lnB>
-                      <a:noFill/>
-                    </a:lnB>
-                  </a:tcPr>
+                  <a:tcPr marL="9359" marR="9359" marT="9359" marB="0" anchor="b"/>
                 </a:tc>
                 <a:extLst>
                   <a:ext uri="{0D108BD9-81ED-4DB2-BD59-A6C34878D82A}">
@@ -16646,31 +16634,24 @@
                     <a:p>
                       <a:pPr algn="r" fontAlgn="b"/>
                       <a:r>
-                        <a:rPr lang="en-GB" sz="1400" b="0" i="0" u="none" strike="noStrike">
+                        <a:rPr lang="en-GB" sz="1400" b="0" u="none" strike="noStrike">
                           <a:solidFill>
                             <a:srgbClr val="000000"/>
                           </a:solidFill>
                           <a:effectLst/>
-                          <a:latin typeface="Calibri" panose="020F0502020204030204" pitchFamily="34" charset="0"/>
                         </a:rPr>
                         <a:t>0</a:t>
                       </a:r>
+                      <a:endParaRPr lang="en-GB" sz="1400" b="0" i="0" u="none" strike="noStrike">
+                        <a:solidFill>
+                          <a:srgbClr val="000000"/>
+                        </a:solidFill>
+                        <a:effectLst/>
+                        <a:latin typeface="Calibri" panose="020F0502020204030204" pitchFamily="34" charset="0"/>
+                      </a:endParaRPr>
                     </a:p>
                   </a:txBody>
-                  <a:tcPr marL="9359" marR="9359" marT="9359" marB="0" anchor="b">
-                    <a:lnL>
-                      <a:noFill/>
-                    </a:lnL>
-                    <a:lnR>
-                      <a:noFill/>
-                    </a:lnR>
-                    <a:lnT>
-                      <a:noFill/>
-                    </a:lnT>
-                    <a:lnB>
-                      <a:noFill/>
-                    </a:lnB>
-                  </a:tcPr>
+                  <a:tcPr marL="9359" marR="9359" marT="9359" marB="0" anchor="b"/>
                 </a:tc>
                 <a:tc>
                   <a:txBody>
@@ -16679,31 +16660,24 @@
                     <a:p>
                       <a:pPr algn="r" fontAlgn="b"/>
                       <a:r>
-                        <a:rPr lang="en-GB" sz="1400" b="0" i="0" u="none" strike="noStrike">
+                        <a:rPr lang="en-GB" sz="1400" b="0" u="none" strike="noStrike">
                           <a:solidFill>
                             <a:srgbClr val="000000"/>
                           </a:solidFill>
                           <a:effectLst/>
-                          <a:latin typeface="Calibri" panose="020F0502020204030204" pitchFamily="34" charset="0"/>
                         </a:rPr>
                         <a:t>1</a:t>
                       </a:r>
+                      <a:endParaRPr lang="en-GB" sz="1400" b="0" i="0" u="none" strike="noStrike">
+                        <a:solidFill>
+                          <a:srgbClr val="000000"/>
+                        </a:solidFill>
+                        <a:effectLst/>
+                        <a:latin typeface="Calibri" panose="020F0502020204030204" pitchFamily="34" charset="0"/>
+                      </a:endParaRPr>
                     </a:p>
                   </a:txBody>
-                  <a:tcPr marL="9359" marR="9359" marT="9359" marB="0" anchor="b">
-                    <a:lnL>
-                      <a:noFill/>
-                    </a:lnL>
-                    <a:lnR>
-                      <a:noFill/>
-                    </a:lnR>
-                    <a:lnT>
-                      <a:noFill/>
-                    </a:lnT>
-                    <a:lnB>
-                      <a:noFill/>
-                    </a:lnB>
-                  </a:tcPr>
+                  <a:tcPr marL="9359" marR="9359" marT="9359" marB="0" anchor="b"/>
                 </a:tc>
                 <a:extLst>
                   <a:ext uri="{0D108BD9-81ED-4DB2-BD59-A6C34878D82A}">
@@ -16719,31 +16693,24 @@
                     <a:p>
                       <a:pPr algn="r" fontAlgn="b"/>
                       <a:r>
-                        <a:rPr lang="en-GB" sz="1400" b="0" i="0" u="none" strike="noStrike">
+                        <a:rPr lang="en-GB" sz="1400" b="0" u="none" strike="noStrike">
                           <a:solidFill>
                             <a:srgbClr val="000000"/>
                           </a:solidFill>
                           <a:effectLst/>
-                          <a:latin typeface="Calibri" panose="020F0502020204030204" pitchFamily="34" charset="0"/>
                         </a:rPr>
                         <a:t>0.1</a:t>
                       </a:r>
+                      <a:endParaRPr lang="en-GB" sz="1400" b="0" i="0" u="none" strike="noStrike">
+                        <a:solidFill>
+                          <a:srgbClr val="000000"/>
+                        </a:solidFill>
+                        <a:effectLst/>
+                        <a:latin typeface="Calibri" panose="020F0502020204030204" pitchFamily="34" charset="0"/>
+                      </a:endParaRPr>
                     </a:p>
                   </a:txBody>
-                  <a:tcPr marL="9359" marR="9359" marT="9359" marB="0" anchor="b">
-                    <a:lnL>
-                      <a:noFill/>
-                    </a:lnL>
-                    <a:lnR>
-                      <a:noFill/>
-                    </a:lnR>
-                    <a:lnT>
-                      <a:noFill/>
-                    </a:lnT>
-                    <a:lnB>
-                      <a:noFill/>
-                    </a:lnB>
-                  </a:tcPr>
+                  <a:tcPr marL="9359" marR="9359" marT="9359" marB="0" anchor="b"/>
                 </a:tc>
                 <a:tc>
                   <a:txBody>
@@ -16752,31 +16719,24 @@
                     <a:p>
                       <a:pPr algn="r" fontAlgn="b"/>
                       <a:r>
-                        <a:rPr lang="en-GB" sz="1400" b="0" i="0" u="none" strike="noStrike">
+                        <a:rPr lang="en-GB" sz="1400" b="0" u="none" strike="noStrike">
                           <a:solidFill>
                             <a:srgbClr val="000000"/>
                           </a:solidFill>
                           <a:effectLst/>
-                          <a:latin typeface="Calibri" panose="020F0502020204030204" pitchFamily="34" charset="0"/>
                         </a:rPr>
                         <a:t>0.99500417</a:t>
                       </a:r>
+                      <a:endParaRPr lang="en-GB" sz="1400" b="0" i="0" u="none" strike="noStrike">
+                        <a:solidFill>
+                          <a:srgbClr val="000000"/>
+                        </a:solidFill>
+                        <a:effectLst/>
+                        <a:latin typeface="Calibri" panose="020F0502020204030204" pitchFamily="34" charset="0"/>
+                      </a:endParaRPr>
                     </a:p>
                   </a:txBody>
-                  <a:tcPr marL="9359" marR="9359" marT="9359" marB="0" anchor="b">
-                    <a:lnL>
-                      <a:noFill/>
-                    </a:lnL>
-                    <a:lnR>
-                      <a:noFill/>
-                    </a:lnR>
-                    <a:lnT>
-                      <a:noFill/>
-                    </a:lnT>
-                    <a:lnB>
-                      <a:noFill/>
-                    </a:lnB>
-                  </a:tcPr>
+                  <a:tcPr marL="9359" marR="9359" marT="9359" marB="0" anchor="b"/>
                 </a:tc>
                 <a:extLst>
                   <a:ext uri="{0D108BD9-81ED-4DB2-BD59-A6C34878D82A}">
@@ -16792,31 +16752,24 @@
                     <a:p>
                       <a:pPr algn="r" fontAlgn="b"/>
                       <a:r>
-                        <a:rPr lang="en-GB" sz="1400" b="0" i="0" u="none" strike="noStrike" dirty="0">
+                        <a:rPr lang="en-GB" sz="1400" b="0" u="none" strike="noStrike" dirty="0">
                           <a:solidFill>
                             <a:srgbClr val="000000"/>
                           </a:solidFill>
                           <a:effectLst/>
-                          <a:latin typeface="Calibri" panose="020F0502020204030204" pitchFamily="34" charset="0"/>
                         </a:rPr>
                         <a:t>0.2</a:t>
                       </a:r>
+                      <a:endParaRPr lang="en-GB" sz="1400" b="0" i="0" u="none" strike="noStrike" dirty="0">
+                        <a:solidFill>
+                          <a:srgbClr val="000000"/>
+                        </a:solidFill>
+                        <a:effectLst/>
+                        <a:latin typeface="Calibri" panose="020F0502020204030204" pitchFamily="34" charset="0"/>
+                      </a:endParaRPr>
                     </a:p>
                   </a:txBody>
-                  <a:tcPr marL="9359" marR="9359" marT="9359" marB="0" anchor="b">
-                    <a:lnL>
-                      <a:noFill/>
-                    </a:lnL>
-                    <a:lnR>
-                      <a:noFill/>
-                    </a:lnR>
-                    <a:lnT>
-                      <a:noFill/>
-                    </a:lnT>
-                    <a:lnB>
-                      <a:noFill/>
-                    </a:lnB>
-                  </a:tcPr>
+                  <a:tcPr marL="9359" marR="9359" marT="9359" marB="0" anchor="b"/>
                 </a:tc>
                 <a:tc>
                   <a:txBody>
@@ -16825,31 +16778,24 @@
                     <a:p>
                       <a:pPr algn="r" fontAlgn="b"/>
                       <a:r>
-                        <a:rPr lang="en-GB" sz="1400" b="0" i="0" u="none" strike="noStrike">
+                        <a:rPr lang="en-GB" sz="1400" b="0" u="none" strike="noStrike">
                           <a:solidFill>
                             <a:srgbClr val="000000"/>
                           </a:solidFill>
                           <a:effectLst/>
-                          <a:latin typeface="Calibri" panose="020F0502020204030204" pitchFamily="34" charset="0"/>
                         </a:rPr>
                         <a:t>0.98006658</a:t>
                       </a:r>
+                      <a:endParaRPr lang="en-GB" sz="1400" b="0" i="0" u="none" strike="noStrike">
+                        <a:solidFill>
+                          <a:srgbClr val="000000"/>
+                        </a:solidFill>
+                        <a:effectLst/>
+                        <a:latin typeface="Calibri" panose="020F0502020204030204" pitchFamily="34" charset="0"/>
+                      </a:endParaRPr>
                     </a:p>
                   </a:txBody>
-                  <a:tcPr marL="9359" marR="9359" marT="9359" marB="0" anchor="b">
-                    <a:lnL>
-                      <a:noFill/>
-                    </a:lnL>
-                    <a:lnR>
-                      <a:noFill/>
-                    </a:lnR>
-                    <a:lnT>
-                      <a:noFill/>
-                    </a:lnT>
-                    <a:lnB>
-                      <a:noFill/>
-                    </a:lnB>
-                  </a:tcPr>
+                  <a:tcPr marL="9359" marR="9359" marT="9359" marB="0" anchor="b"/>
                 </a:tc>
                 <a:extLst>
                   <a:ext uri="{0D108BD9-81ED-4DB2-BD59-A6C34878D82A}">
@@ -16865,31 +16811,24 @@
                     <a:p>
                       <a:pPr algn="r" fontAlgn="b"/>
                       <a:r>
-                        <a:rPr lang="en-GB" sz="1400" b="0" i="0" u="none" strike="noStrike">
+                        <a:rPr lang="en-GB" sz="1400" b="0" u="none" strike="noStrike">
                           <a:solidFill>
                             <a:srgbClr val="000000"/>
                           </a:solidFill>
                           <a:effectLst/>
-                          <a:latin typeface="Calibri" panose="020F0502020204030204" pitchFamily="34" charset="0"/>
                         </a:rPr>
                         <a:t>0.3</a:t>
                       </a:r>
+                      <a:endParaRPr lang="en-GB" sz="1400" b="0" i="0" u="none" strike="noStrike">
+                        <a:solidFill>
+                          <a:srgbClr val="000000"/>
+                        </a:solidFill>
+                        <a:effectLst/>
+                        <a:latin typeface="Calibri" panose="020F0502020204030204" pitchFamily="34" charset="0"/>
+                      </a:endParaRPr>
                     </a:p>
                   </a:txBody>
-                  <a:tcPr marL="9359" marR="9359" marT="9359" marB="0" anchor="b">
-                    <a:lnL>
-                      <a:noFill/>
-                    </a:lnL>
-                    <a:lnR>
-                      <a:noFill/>
-                    </a:lnR>
-                    <a:lnT>
-                      <a:noFill/>
-                    </a:lnT>
-                    <a:lnB>
-                      <a:noFill/>
-                    </a:lnB>
-                  </a:tcPr>
+                  <a:tcPr marL="9359" marR="9359" marT="9359" marB="0" anchor="b"/>
                 </a:tc>
                 <a:tc>
                   <a:txBody>
@@ -16898,31 +16837,24 @@
                     <a:p>
                       <a:pPr algn="r" fontAlgn="b"/>
                       <a:r>
-                        <a:rPr lang="en-GB" sz="1400" b="0" i="0" u="none" strike="noStrike">
+                        <a:rPr lang="en-GB" sz="1400" b="0" u="none" strike="noStrike">
                           <a:solidFill>
                             <a:srgbClr val="000000"/>
                           </a:solidFill>
                           <a:effectLst/>
-                          <a:latin typeface="Calibri" panose="020F0502020204030204" pitchFamily="34" charset="0"/>
                         </a:rPr>
                         <a:t>0.95533649</a:t>
                       </a:r>
+                      <a:endParaRPr lang="en-GB" sz="1400" b="0" i="0" u="none" strike="noStrike">
+                        <a:solidFill>
+                          <a:srgbClr val="000000"/>
+                        </a:solidFill>
+                        <a:effectLst/>
+                        <a:latin typeface="Calibri" panose="020F0502020204030204" pitchFamily="34" charset="0"/>
+                      </a:endParaRPr>
                     </a:p>
                   </a:txBody>
-                  <a:tcPr marL="9359" marR="9359" marT="9359" marB="0" anchor="b">
-                    <a:lnL>
-                      <a:noFill/>
-                    </a:lnL>
-                    <a:lnR>
-                      <a:noFill/>
-                    </a:lnR>
-                    <a:lnT>
-                      <a:noFill/>
-                    </a:lnT>
-                    <a:lnB>
-                      <a:noFill/>
-                    </a:lnB>
-                  </a:tcPr>
+                  <a:tcPr marL="9359" marR="9359" marT="9359" marB="0" anchor="b"/>
                 </a:tc>
                 <a:extLst>
                   <a:ext uri="{0D108BD9-81ED-4DB2-BD59-A6C34878D82A}">
@@ -16938,31 +16870,24 @@
                     <a:p>
                       <a:pPr algn="r" fontAlgn="b"/>
                       <a:r>
-                        <a:rPr lang="en-GB" sz="1400" b="0" i="0" u="none" strike="noStrike">
+                        <a:rPr lang="en-GB" sz="1400" b="0" u="none" strike="noStrike">
                           <a:solidFill>
                             <a:srgbClr val="000000"/>
                           </a:solidFill>
                           <a:effectLst/>
-                          <a:latin typeface="Calibri" panose="020F0502020204030204" pitchFamily="34" charset="0"/>
                         </a:rPr>
                         <a:t>0.4</a:t>
                       </a:r>
+                      <a:endParaRPr lang="en-GB" sz="1400" b="0" i="0" u="none" strike="noStrike">
+                        <a:solidFill>
+                          <a:srgbClr val="000000"/>
+                        </a:solidFill>
+                        <a:effectLst/>
+                        <a:latin typeface="Calibri" panose="020F0502020204030204" pitchFamily="34" charset="0"/>
+                      </a:endParaRPr>
                     </a:p>
                   </a:txBody>
-                  <a:tcPr marL="9359" marR="9359" marT="9359" marB="0" anchor="b">
-                    <a:lnL>
-                      <a:noFill/>
-                    </a:lnL>
-                    <a:lnR>
-                      <a:noFill/>
-                    </a:lnR>
-                    <a:lnT>
-                      <a:noFill/>
-                    </a:lnT>
-                    <a:lnB>
-                      <a:noFill/>
-                    </a:lnB>
-                  </a:tcPr>
+                  <a:tcPr marL="9359" marR="9359" marT="9359" marB="0" anchor="b"/>
                 </a:tc>
                 <a:tc>
                   <a:txBody>
@@ -16971,31 +16896,24 @@
                     <a:p>
                       <a:pPr algn="r" fontAlgn="b"/>
                       <a:r>
-                        <a:rPr lang="en-GB" sz="1400" b="0" i="0" u="none" strike="noStrike">
+                        <a:rPr lang="en-GB" sz="1400" b="0" u="none" strike="noStrike">
                           <a:solidFill>
                             <a:srgbClr val="000000"/>
                           </a:solidFill>
                           <a:effectLst/>
-                          <a:latin typeface="Calibri" panose="020F0502020204030204" pitchFamily="34" charset="0"/>
                         </a:rPr>
                         <a:t>0.92106099</a:t>
                       </a:r>
+                      <a:endParaRPr lang="en-GB" sz="1400" b="0" i="0" u="none" strike="noStrike">
+                        <a:solidFill>
+                          <a:srgbClr val="000000"/>
+                        </a:solidFill>
+                        <a:effectLst/>
+                        <a:latin typeface="Calibri" panose="020F0502020204030204" pitchFamily="34" charset="0"/>
+                      </a:endParaRPr>
                     </a:p>
                   </a:txBody>
-                  <a:tcPr marL="9359" marR="9359" marT="9359" marB="0" anchor="b">
-                    <a:lnL>
-                      <a:noFill/>
-                    </a:lnL>
-                    <a:lnR>
-                      <a:noFill/>
-                    </a:lnR>
-                    <a:lnT>
-                      <a:noFill/>
-                    </a:lnT>
-                    <a:lnB>
-                      <a:noFill/>
-                    </a:lnB>
-                  </a:tcPr>
+                  <a:tcPr marL="9359" marR="9359" marT="9359" marB="0" anchor="b"/>
                 </a:tc>
                 <a:extLst>
                   <a:ext uri="{0D108BD9-81ED-4DB2-BD59-A6C34878D82A}">
@@ -17011,31 +16929,24 @@
                     <a:p>
                       <a:pPr algn="r" fontAlgn="b"/>
                       <a:r>
-                        <a:rPr lang="en-GB" sz="1400" b="0" i="0" u="none" strike="noStrike">
+                        <a:rPr lang="en-GB" sz="1400" b="0" u="none" strike="noStrike">
                           <a:solidFill>
                             <a:srgbClr val="000000"/>
                           </a:solidFill>
                           <a:effectLst/>
-                          <a:latin typeface="Calibri" panose="020F0502020204030204" pitchFamily="34" charset="0"/>
                         </a:rPr>
                         <a:t>0.5</a:t>
                       </a:r>
+                      <a:endParaRPr lang="en-GB" sz="1400" b="0" i="0" u="none" strike="noStrike">
+                        <a:solidFill>
+                          <a:srgbClr val="000000"/>
+                        </a:solidFill>
+                        <a:effectLst/>
+                        <a:latin typeface="Calibri" panose="020F0502020204030204" pitchFamily="34" charset="0"/>
+                      </a:endParaRPr>
                     </a:p>
                   </a:txBody>
-                  <a:tcPr marL="9359" marR="9359" marT="9359" marB="0" anchor="b">
-                    <a:lnL>
-                      <a:noFill/>
-                    </a:lnL>
-                    <a:lnR>
-                      <a:noFill/>
-                    </a:lnR>
-                    <a:lnT>
-                      <a:noFill/>
-                    </a:lnT>
-                    <a:lnB>
-                      <a:noFill/>
-                    </a:lnB>
-                  </a:tcPr>
+                  <a:tcPr marL="9359" marR="9359" marT="9359" marB="0" anchor="b"/>
                 </a:tc>
                 <a:tc>
                   <a:txBody>
@@ -17044,31 +16955,24 @@
                     <a:p>
                       <a:pPr algn="r" fontAlgn="b"/>
                       <a:r>
-                        <a:rPr lang="en-GB" sz="1400" b="0" i="0" u="none" strike="noStrike">
+                        <a:rPr lang="en-GB" sz="1400" b="0" u="none" strike="noStrike">
                           <a:solidFill>
                             <a:srgbClr val="000000"/>
                           </a:solidFill>
                           <a:effectLst/>
-                          <a:latin typeface="Calibri" panose="020F0502020204030204" pitchFamily="34" charset="0"/>
                         </a:rPr>
                         <a:t>0.87758256</a:t>
                       </a:r>
+                      <a:endParaRPr lang="en-GB" sz="1400" b="0" i="0" u="none" strike="noStrike">
+                        <a:solidFill>
+                          <a:srgbClr val="000000"/>
+                        </a:solidFill>
+                        <a:effectLst/>
+                        <a:latin typeface="Calibri" panose="020F0502020204030204" pitchFamily="34" charset="0"/>
+                      </a:endParaRPr>
                     </a:p>
                   </a:txBody>
-                  <a:tcPr marL="9359" marR="9359" marT="9359" marB="0" anchor="b">
-                    <a:lnL>
-                      <a:noFill/>
-                    </a:lnL>
-                    <a:lnR>
-                      <a:noFill/>
-                    </a:lnR>
-                    <a:lnT>
-                      <a:noFill/>
-                    </a:lnT>
-                    <a:lnB>
-                      <a:noFill/>
-                    </a:lnB>
-                  </a:tcPr>
+                  <a:tcPr marL="9359" marR="9359" marT="9359" marB="0" anchor="b"/>
                 </a:tc>
                 <a:extLst>
                   <a:ext uri="{0D108BD9-81ED-4DB2-BD59-A6C34878D82A}">
@@ -17084,31 +16988,24 @@
                     <a:p>
                       <a:pPr algn="r" fontAlgn="b"/>
                       <a:r>
-                        <a:rPr lang="en-GB" sz="1400" b="0" i="0" u="none" strike="noStrike">
+                        <a:rPr lang="en-GB" sz="1400" b="0" u="none" strike="noStrike">
                           <a:solidFill>
                             <a:srgbClr val="000000"/>
                           </a:solidFill>
                           <a:effectLst/>
-                          <a:latin typeface="Calibri" panose="020F0502020204030204" pitchFamily="34" charset="0"/>
                         </a:rPr>
                         <a:t>0.6</a:t>
                       </a:r>
+                      <a:endParaRPr lang="en-GB" sz="1400" b="0" i="0" u="none" strike="noStrike">
+                        <a:solidFill>
+                          <a:srgbClr val="000000"/>
+                        </a:solidFill>
+                        <a:effectLst/>
+                        <a:latin typeface="Calibri" panose="020F0502020204030204" pitchFamily="34" charset="0"/>
+                      </a:endParaRPr>
                     </a:p>
                   </a:txBody>
-                  <a:tcPr marL="9359" marR="9359" marT="9359" marB="0" anchor="b">
-                    <a:lnL>
-                      <a:noFill/>
-                    </a:lnL>
-                    <a:lnR>
-                      <a:noFill/>
-                    </a:lnR>
-                    <a:lnT>
-                      <a:noFill/>
-                    </a:lnT>
-                    <a:lnB>
-                      <a:noFill/>
-                    </a:lnB>
-                  </a:tcPr>
+                  <a:tcPr marL="9359" marR="9359" marT="9359" marB="0" anchor="b"/>
                 </a:tc>
                 <a:tc>
                   <a:txBody>
@@ -17117,31 +17014,24 @@
                     <a:p>
                       <a:pPr algn="r" fontAlgn="b"/>
                       <a:r>
-                        <a:rPr lang="en-GB" sz="1400" b="0" i="0" u="none" strike="noStrike">
+                        <a:rPr lang="en-GB" sz="1400" b="0" u="none" strike="noStrike">
                           <a:solidFill>
                             <a:srgbClr val="000000"/>
                           </a:solidFill>
                           <a:effectLst/>
-                          <a:latin typeface="Calibri" panose="020F0502020204030204" pitchFamily="34" charset="0"/>
                         </a:rPr>
                         <a:t>0.82533561</a:t>
                       </a:r>
+                      <a:endParaRPr lang="en-GB" sz="1400" b="0" i="0" u="none" strike="noStrike">
+                        <a:solidFill>
+                          <a:srgbClr val="000000"/>
+                        </a:solidFill>
+                        <a:effectLst/>
+                        <a:latin typeface="Calibri" panose="020F0502020204030204" pitchFamily="34" charset="0"/>
+                      </a:endParaRPr>
                     </a:p>
                   </a:txBody>
-                  <a:tcPr marL="9359" marR="9359" marT="9359" marB="0" anchor="b">
-                    <a:lnL>
-                      <a:noFill/>
-                    </a:lnL>
-                    <a:lnR>
-                      <a:noFill/>
-                    </a:lnR>
-                    <a:lnT>
-                      <a:noFill/>
-                    </a:lnT>
-                    <a:lnB>
-                      <a:noFill/>
-                    </a:lnB>
-                  </a:tcPr>
+                  <a:tcPr marL="9359" marR="9359" marT="9359" marB="0" anchor="b"/>
                 </a:tc>
                 <a:extLst>
                   <a:ext uri="{0D108BD9-81ED-4DB2-BD59-A6C34878D82A}">
@@ -17157,31 +17047,24 @@
                     <a:p>
                       <a:pPr algn="r" fontAlgn="b"/>
                       <a:r>
-                        <a:rPr lang="en-GB" sz="1400" b="0" i="0" u="none" strike="noStrike">
+                        <a:rPr lang="en-GB" sz="1400" b="0" u="none" strike="noStrike">
                           <a:solidFill>
                             <a:srgbClr val="000000"/>
                           </a:solidFill>
                           <a:effectLst/>
-                          <a:latin typeface="Calibri" panose="020F0502020204030204" pitchFamily="34" charset="0"/>
                         </a:rPr>
                         <a:t>0.7</a:t>
                       </a:r>
+                      <a:endParaRPr lang="en-GB" sz="1400" b="0" i="0" u="none" strike="noStrike">
+                        <a:solidFill>
+                          <a:srgbClr val="000000"/>
+                        </a:solidFill>
+                        <a:effectLst/>
+                        <a:latin typeface="Calibri" panose="020F0502020204030204" pitchFamily="34" charset="0"/>
+                      </a:endParaRPr>
                     </a:p>
                   </a:txBody>
-                  <a:tcPr marL="9359" marR="9359" marT="9359" marB="0" anchor="b">
-                    <a:lnL>
-                      <a:noFill/>
-                    </a:lnL>
-                    <a:lnR>
-                      <a:noFill/>
-                    </a:lnR>
-                    <a:lnT>
-                      <a:noFill/>
-                    </a:lnT>
-                    <a:lnB>
-                      <a:noFill/>
-                    </a:lnB>
-                  </a:tcPr>
+                  <a:tcPr marL="9359" marR="9359" marT="9359" marB="0" anchor="b"/>
                 </a:tc>
                 <a:tc>
                   <a:txBody>
@@ -17190,31 +17073,24 @@
                     <a:p>
                       <a:pPr algn="r" fontAlgn="b"/>
                       <a:r>
-                        <a:rPr lang="en-GB" sz="1400" b="0" i="0" u="none" strike="noStrike">
+                        <a:rPr lang="en-GB" sz="1400" b="0" u="none" strike="noStrike">
                           <a:solidFill>
                             <a:srgbClr val="000000"/>
                           </a:solidFill>
                           <a:effectLst/>
-                          <a:latin typeface="Calibri" panose="020F0502020204030204" pitchFamily="34" charset="0"/>
                         </a:rPr>
                         <a:t>0.76484219</a:t>
                       </a:r>
+                      <a:endParaRPr lang="en-GB" sz="1400" b="0" i="0" u="none" strike="noStrike">
+                        <a:solidFill>
+                          <a:srgbClr val="000000"/>
+                        </a:solidFill>
+                        <a:effectLst/>
+                        <a:latin typeface="Calibri" panose="020F0502020204030204" pitchFamily="34" charset="0"/>
+                      </a:endParaRPr>
                     </a:p>
                   </a:txBody>
-                  <a:tcPr marL="9359" marR="9359" marT="9359" marB="0" anchor="b">
-                    <a:lnL>
-                      <a:noFill/>
-                    </a:lnL>
-                    <a:lnR>
-                      <a:noFill/>
-                    </a:lnR>
-                    <a:lnT>
-                      <a:noFill/>
-                    </a:lnT>
-                    <a:lnB>
-                      <a:noFill/>
-                    </a:lnB>
-                  </a:tcPr>
+                  <a:tcPr marL="9359" marR="9359" marT="9359" marB="0" anchor="b"/>
                 </a:tc>
                 <a:extLst>
                   <a:ext uri="{0D108BD9-81ED-4DB2-BD59-A6C34878D82A}">
@@ -17230,31 +17106,24 @@
                     <a:p>
                       <a:pPr algn="r" fontAlgn="b"/>
                       <a:r>
-                        <a:rPr lang="en-GB" sz="1400" b="0" i="0" u="none" strike="noStrike">
+                        <a:rPr lang="en-GB" sz="1400" b="0" u="none" strike="noStrike">
                           <a:solidFill>
                             <a:srgbClr val="000000"/>
                           </a:solidFill>
                           <a:effectLst/>
-                          <a:latin typeface="Calibri" panose="020F0502020204030204" pitchFamily="34" charset="0"/>
                         </a:rPr>
                         <a:t>0.8</a:t>
                       </a:r>
+                      <a:endParaRPr lang="en-GB" sz="1400" b="0" i="0" u="none" strike="noStrike">
+                        <a:solidFill>
+                          <a:srgbClr val="000000"/>
+                        </a:solidFill>
+                        <a:effectLst/>
+                        <a:latin typeface="Calibri" panose="020F0502020204030204" pitchFamily="34" charset="0"/>
+                      </a:endParaRPr>
                     </a:p>
                   </a:txBody>
-                  <a:tcPr marL="9359" marR="9359" marT="9359" marB="0" anchor="b">
-                    <a:lnL>
-                      <a:noFill/>
-                    </a:lnL>
-                    <a:lnR>
-                      <a:noFill/>
-                    </a:lnR>
-                    <a:lnT>
-                      <a:noFill/>
-                    </a:lnT>
-                    <a:lnB>
-                      <a:noFill/>
-                    </a:lnB>
-                  </a:tcPr>
+                  <a:tcPr marL="9359" marR="9359" marT="9359" marB="0" anchor="b"/>
                 </a:tc>
                 <a:tc>
                   <a:txBody>
@@ -17263,31 +17132,24 @@
                     <a:p>
                       <a:pPr algn="r" fontAlgn="b"/>
                       <a:r>
-                        <a:rPr lang="en-GB" sz="1400" b="0" i="0" u="none" strike="noStrike">
+                        <a:rPr lang="en-GB" sz="1400" b="0" u="none" strike="noStrike">
                           <a:solidFill>
                             <a:srgbClr val="000000"/>
                           </a:solidFill>
                           <a:effectLst/>
-                          <a:latin typeface="Calibri" panose="020F0502020204030204" pitchFamily="34" charset="0"/>
                         </a:rPr>
                         <a:t>0.69670671</a:t>
                       </a:r>
+                      <a:endParaRPr lang="en-GB" sz="1400" b="0" i="0" u="none" strike="noStrike">
+                        <a:solidFill>
+                          <a:srgbClr val="000000"/>
+                        </a:solidFill>
+                        <a:effectLst/>
+                        <a:latin typeface="Calibri" panose="020F0502020204030204" pitchFamily="34" charset="0"/>
+                      </a:endParaRPr>
                     </a:p>
                   </a:txBody>
-                  <a:tcPr marL="9359" marR="9359" marT="9359" marB="0" anchor="b">
-                    <a:lnL>
-                      <a:noFill/>
-                    </a:lnL>
-                    <a:lnR>
-                      <a:noFill/>
-                    </a:lnR>
-                    <a:lnT>
-                      <a:noFill/>
-                    </a:lnT>
-                    <a:lnB>
-                      <a:noFill/>
-                    </a:lnB>
-                  </a:tcPr>
+                  <a:tcPr marL="9359" marR="9359" marT="9359" marB="0" anchor="b"/>
                 </a:tc>
                 <a:extLst>
                   <a:ext uri="{0D108BD9-81ED-4DB2-BD59-A6C34878D82A}">
@@ -17303,31 +17165,24 @@
                     <a:p>
                       <a:pPr algn="r" fontAlgn="b"/>
                       <a:r>
-                        <a:rPr lang="en-GB" sz="1400" b="0" i="0" u="none" strike="noStrike">
+                        <a:rPr lang="en-GB" sz="1400" b="0" u="none" strike="noStrike">
                           <a:solidFill>
                             <a:srgbClr val="000000"/>
                           </a:solidFill>
                           <a:effectLst/>
-                          <a:latin typeface="Calibri" panose="020F0502020204030204" pitchFamily="34" charset="0"/>
                         </a:rPr>
                         <a:t>0.9</a:t>
                       </a:r>
+                      <a:endParaRPr lang="en-GB" sz="1400" b="0" i="0" u="none" strike="noStrike">
+                        <a:solidFill>
+                          <a:srgbClr val="000000"/>
+                        </a:solidFill>
+                        <a:effectLst/>
+                        <a:latin typeface="Calibri" panose="020F0502020204030204" pitchFamily="34" charset="0"/>
+                      </a:endParaRPr>
                     </a:p>
                   </a:txBody>
-                  <a:tcPr marL="9359" marR="9359" marT="9359" marB="0" anchor="b">
-                    <a:lnL>
-                      <a:noFill/>
-                    </a:lnL>
-                    <a:lnR>
-                      <a:noFill/>
-                    </a:lnR>
-                    <a:lnT>
-                      <a:noFill/>
-                    </a:lnT>
-                    <a:lnB>
-                      <a:noFill/>
-                    </a:lnB>
-                  </a:tcPr>
+                  <a:tcPr marL="9359" marR="9359" marT="9359" marB="0" anchor="b"/>
                 </a:tc>
                 <a:tc>
                   <a:txBody>
@@ -17336,31 +17191,24 @@
                     <a:p>
                       <a:pPr algn="r" fontAlgn="b"/>
                       <a:r>
-                        <a:rPr lang="en-GB" sz="1400" b="0" i="0" u="none" strike="noStrike">
+                        <a:rPr lang="en-GB" sz="1400" b="0" u="none" strike="noStrike">
                           <a:solidFill>
                             <a:srgbClr val="000000"/>
                           </a:solidFill>
                           <a:effectLst/>
-                          <a:latin typeface="Calibri" panose="020F0502020204030204" pitchFamily="34" charset="0"/>
                         </a:rPr>
                         <a:t>0.62160997</a:t>
                       </a:r>
+                      <a:endParaRPr lang="en-GB" sz="1400" b="0" i="0" u="none" strike="noStrike">
+                        <a:solidFill>
+                          <a:srgbClr val="000000"/>
+                        </a:solidFill>
+                        <a:effectLst/>
+                        <a:latin typeface="Calibri" panose="020F0502020204030204" pitchFamily="34" charset="0"/>
+                      </a:endParaRPr>
                     </a:p>
                   </a:txBody>
-                  <a:tcPr marL="9359" marR="9359" marT="9359" marB="0" anchor="b">
-                    <a:lnL>
-                      <a:noFill/>
-                    </a:lnL>
-                    <a:lnR>
-                      <a:noFill/>
-                    </a:lnR>
-                    <a:lnT>
-                      <a:noFill/>
-                    </a:lnT>
-                    <a:lnB>
-                      <a:noFill/>
-                    </a:lnB>
-                  </a:tcPr>
+                  <a:tcPr marL="9359" marR="9359" marT="9359" marB="0" anchor="b"/>
                 </a:tc>
                 <a:extLst>
                   <a:ext uri="{0D108BD9-81ED-4DB2-BD59-A6C34878D82A}">
@@ -17376,31 +17224,24 @@
                     <a:p>
                       <a:pPr algn="r" fontAlgn="b"/>
                       <a:r>
-                        <a:rPr lang="en-GB" sz="1400" b="0" i="0" u="none" strike="noStrike">
+                        <a:rPr lang="en-GB" sz="1400" b="0" u="none" strike="noStrike">
                           <a:solidFill>
                             <a:srgbClr val="000000"/>
                           </a:solidFill>
                           <a:effectLst/>
-                          <a:latin typeface="Calibri" panose="020F0502020204030204" pitchFamily="34" charset="0"/>
                         </a:rPr>
                         <a:t>1</a:t>
                       </a:r>
+                      <a:endParaRPr lang="en-GB" sz="1400" b="0" i="0" u="none" strike="noStrike">
+                        <a:solidFill>
+                          <a:srgbClr val="000000"/>
+                        </a:solidFill>
+                        <a:effectLst/>
+                        <a:latin typeface="Calibri" panose="020F0502020204030204" pitchFamily="34" charset="0"/>
+                      </a:endParaRPr>
                     </a:p>
                   </a:txBody>
-                  <a:tcPr marL="9359" marR="9359" marT="9359" marB="0" anchor="b">
-                    <a:lnL>
-                      <a:noFill/>
-                    </a:lnL>
-                    <a:lnR>
-                      <a:noFill/>
-                    </a:lnR>
-                    <a:lnT>
-                      <a:noFill/>
-                    </a:lnT>
-                    <a:lnB>
-                      <a:noFill/>
-                    </a:lnB>
-                  </a:tcPr>
+                  <a:tcPr marL="9359" marR="9359" marT="9359" marB="0" anchor="b"/>
                 </a:tc>
                 <a:tc>
                   <a:txBody>
@@ -17409,31 +17250,24 @@
                     <a:p>
                       <a:pPr algn="r" fontAlgn="b"/>
                       <a:r>
-                        <a:rPr lang="en-GB" sz="1400" b="0" i="0" u="none" strike="noStrike">
+                        <a:rPr lang="en-GB" sz="1400" b="0" u="none" strike="noStrike">
                           <a:solidFill>
                             <a:srgbClr val="000000"/>
                           </a:solidFill>
                           <a:effectLst/>
-                          <a:latin typeface="Calibri" panose="020F0502020204030204" pitchFamily="34" charset="0"/>
                         </a:rPr>
                         <a:t>0.54030231</a:t>
                       </a:r>
+                      <a:endParaRPr lang="en-GB" sz="1400" b="0" i="0" u="none" strike="noStrike">
+                        <a:solidFill>
+                          <a:srgbClr val="000000"/>
+                        </a:solidFill>
+                        <a:effectLst/>
+                        <a:latin typeface="Calibri" panose="020F0502020204030204" pitchFamily="34" charset="0"/>
+                      </a:endParaRPr>
                     </a:p>
                   </a:txBody>
-                  <a:tcPr marL="9359" marR="9359" marT="9359" marB="0" anchor="b">
-                    <a:lnL>
-                      <a:noFill/>
-                    </a:lnL>
-                    <a:lnR>
-                      <a:noFill/>
-                    </a:lnR>
-                    <a:lnT>
-                      <a:noFill/>
-                    </a:lnT>
-                    <a:lnB>
-                      <a:noFill/>
-                    </a:lnB>
-                  </a:tcPr>
+                  <a:tcPr marL="9359" marR="9359" marT="9359" marB="0" anchor="b"/>
                 </a:tc>
                 <a:extLst>
                   <a:ext uri="{0D108BD9-81ED-4DB2-BD59-A6C34878D82A}">
@@ -17449,31 +17283,24 @@
                     <a:p>
                       <a:pPr algn="r" fontAlgn="b"/>
                       <a:r>
-                        <a:rPr lang="en-GB" sz="1400" b="0" i="0" u="none" strike="noStrike">
+                        <a:rPr lang="en-GB" sz="1400" b="0" u="none" strike="noStrike">
                           <a:solidFill>
                             <a:srgbClr val="000000"/>
                           </a:solidFill>
                           <a:effectLst/>
-                          <a:latin typeface="Calibri" panose="020F0502020204030204" pitchFamily="34" charset="0"/>
                         </a:rPr>
                         <a:t>1.1</a:t>
                       </a:r>
+                      <a:endParaRPr lang="en-GB" sz="1400" b="0" i="0" u="none" strike="noStrike">
+                        <a:solidFill>
+                          <a:srgbClr val="000000"/>
+                        </a:solidFill>
+                        <a:effectLst/>
+                        <a:latin typeface="Calibri" panose="020F0502020204030204" pitchFamily="34" charset="0"/>
+                      </a:endParaRPr>
                     </a:p>
                   </a:txBody>
-                  <a:tcPr marL="9359" marR="9359" marT="9359" marB="0" anchor="b">
-                    <a:lnL>
-                      <a:noFill/>
-                    </a:lnL>
-                    <a:lnR>
-                      <a:noFill/>
-                    </a:lnR>
-                    <a:lnT>
-                      <a:noFill/>
-                    </a:lnT>
-                    <a:lnB>
-                      <a:noFill/>
-                    </a:lnB>
-                  </a:tcPr>
+                  <a:tcPr marL="9359" marR="9359" marT="9359" marB="0" anchor="b"/>
                 </a:tc>
                 <a:tc>
                   <a:txBody>
@@ -17482,31 +17309,24 @@
                     <a:p>
                       <a:pPr algn="r" fontAlgn="b"/>
                       <a:r>
-                        <a:rPr lang="en-GB" sz="1400" b="0" i="0" u="none" strike="noStrike">
+                        <a:rPr lang="en-GB" sz="1400" b="0" u="none" strike="noStrike">
                           <a:solidFill>
                             <a:srgbClr val="000000"/>
                           </a:solidFill>
                           <a:effectLst/>
-                          <a:latin typeface="Calibri" panose="020F0502020204030204" pitchFamily="34" charset="0"/>
                         </a:rPr>
                         <a:t>0.45359612</a:t>
                       </a:r>
+                      <a:endParaRPr lang="en-GB" sz="1400" b="0" i="0" u="none" strike="noStrike">
+                        <a:solidFill>
+                          <a:srgbClr val="000000"/>
+                        </a:solidFill>
+                        <a:effectLst/>
+                        <a:latin typeface="Calibri" panose="020F0502020204030204" pitchFamily="34" charset="0"/>
+                      </a:endParaRPr>
                     </a:p>
                   </a:txBody>
-                  <a:tcPr marL="9359" marR="9359" marT="9359" marB="0" anchor="b">
-                    <a:lnL>
-                      <a:noFill/>
-                    </a:lnL>
-                    <a:lnR>
-                      <a:noFill/>
-                    </a:lnR>
-                    <a:lnT>
-                      <a:noFill/>
-                    </a:lnT>
-                    <a:lnB>
-                      <a:noFill/>
-                    </a:lnB>
-                  </a:tcPr>
+                  <a:tcPr marL="9359" marR="9359" marT="9359" marB="0" anchor="b"/>
                 </a:tc>
                 <a:extLst>
                   <a:ext uri="{0D108BD9-81ED-4DB2-BD59-A6C34878D82A}">
@@ -17522,31 +17342,24 @@
                     <a:p>
                       <a:pPr algn="r" fontAlgn="b"/>
                       <a:r>
-                        <a:rPr lang="en-GB" sz="1400" b="0" i="0" u="none" strike="noStrike">
+                        <a:rPr lang="en-GB" sz="1400" b="0" u="none" strike="noStrike">
                           <a:solidFill>
                             <a:srgbClr val="000000"/>
                           </a:solidFill>
                           <a:effectLst/>
-                          <a:latin typeface="Calibri" panose="020F0502020204030204" pitchFamily="34" charset="0"/>
                         </a:rPr>
                         <a:t>1.2</a:t>
                       </a:r>
+                      <a:endParaRPr lang="en-GB" sz="1400" b="0" i="0" u="none" strike="noStrike">
+                        <a:solidFill>
+                          <a:srgbClr val="000000"/>
+                        </a:solidFill>
+                        <a:effectLst/>
+                        <a:latin typeface="Calibri" panose="020F0502020204030204" pitchFamily="34" charset="0"/>
+                      </a:endParaRPr>
                     </a:p>
                   </a:txBody>
-                  <a:tcPr marL="9359" marR="9359" marT="9359" marB="0" anchor="b">
-                    <a:lnL>
-                      <a:noFill/>
-                    </a:lnL>
-                    <a:lnR>
-                      <a:noFill/>
-                    </a:lnR>
-                    <a:lnT>
-                      <a:noFill/>
-                    </a:lnT>
-                    <a:lnB>
-                      <a:noFill/>
-                    </a:lnB>
-                  </a:tcPr>
+                  <a:tcPr marL="9359" marR="9359" marT="9359" marB="0" anchor="b"/>
                 </a:tc>
                 <a:tc>
                   <a:txBody>
@@ -17555,31 +17368,24 @@
                     <a:p>
                       <a:pPr algn="r" fontAlgn="b"/>
                       <a:r>
-                        <a:rPr lang="en-GB" sz="1400" b="0" i="0" u="none" strike="noStrike">
+                        <a:rPr lang="en-GB" sz="1400" b="0" u="none" strike="noStrike">
                           <a:solidFill>
                             <a:srgbClr val="000000"/>
                           </a:solidFill>
                           <a:effectLst/>
-                          <a:latin typeface="Calibri" panose="020F0502020204030204" pitchFamily="34" charset="0"/>
                         </a:rPr>
                         <a:t>0.36235775</a:t>
                       </a:r>
+                      <a:endParaRPr lang="en-GB" sz="1400" b="0" i="0" u="none" strike="noStrike">
+                        <a:solidFill>
+                          <a:srgbClr val="000000"/>
+                        </a:solidFill>
+                        <a:effectLst/>
+                        <a:latin typeface="Calibri" panose="020F0502020204030204" pitchFamily="34" charset="0"/>
+                      </a:endParaRPr>
                     </a:p>
                   </a:txBody>
-                  <a:tcPr marL="9359" marR="9359" marT="9359" marB="0" anchor="b">
-                    <a:lnL>
-                      <a:noFill/>
-                    </a:lnL>
-                    <a:lnR>
-                      <a:noFill/>
-                    </a:lnR>
-                    <a:lnT>
-                      <a:noFill/>
-                    </a:lnT>
-                    <a:lnB>
-                      <a:noFill/>
-                    </a:lnB>
-                  </a:tcPr>
+                  <a:tcPr marL="9359" marR="9359" marT="9359" marB="0" anchor="b"/>
                 </a:tc>
                 <a:extLst>
                   <a:ext uri="{0D108BD9-81ED-4DB2-BD59-A6C34878D82A}">
@@ -17595,31 +17401,24 @@
                     <a:p>
                       <a:pPr algn="r" fontAlgn="b"/>
                       <a:r>
-                        <a:rPr lang="en-GB" sz="1400" b="0" i="0" u="none" strike="noStrike">
+                        <a:rPr lang="en-GB" sz="1400" b="0" u="none" strike="noStrike">
                           <a:solidFill>
                             <a:srgbClr val="000000"/>
                           </a:solidFill>
                           <a:effectLst/>
-                          <a:latin typeface="Calibri" panose="020F0502020204030204" pitchFamily="34" charset="0"/>
                         </a:rPr>
                         <a:t>1.3</a:t>
                       </a:r>
+                      <a:endParaRPr lang="en-GB" sz="1400" b="0" i="0" u="none" strike="noStrike">
+                        <a:solidFill>
+                          <a:srgbClr val="000000"/>
+                        </a:solidFill>
+                        <a:effectLst/>
+                        <a:latin typeface="Calibri" panose="020F0502020204030204" pitchFamily="34" charset="0"/>
+                      </a:endParaRPr>
                     </a:p>
                   </a:txBody>
-                  <a:tcPr marL="9359" marR="9359" marT="9359" marB="0" anchor="b">
-                    <a:lnL>
-                      <a:noFill/>
-                    </a:lnL>
-                    <a:lnR>
-                      <a:noFill/>
-                    </a:lnR>
-                    <a:lnT>
-                      <a:noFill/>
-                    </a:lnT>
-                    <a:lnB>
-                      <a:noFill/>
-                    </a:lnB>
-                  </a:tcPr>
+                  <a:tcPr marL="9359" marR="9359" marT="9359" marB="0" anchor="b"/>
                 </a:tc>
                 <a:tc>
                   <a:txBody>
@@ -17628,31 +17427,24 @@
                     <a:p>
                       <a:pPr algn="r" fontAlgn="b"/>
                       <a:r>
-                        <a:rPr lang="en-GB" sz="1400" b="0" i="0" u="none" strike="noStrike">
+                        <a:rPr lang="en-GB" sz="1400" b="0" u="none" strike="noStrike">
                           <a:solidFill>
                             <a:srgbClr val="000000"/>
                           </a:solidFill>
                           <a:effectLst/>
-                          <a:latin typeface="Calibri" panose="020F0502020204030204" pitchFamily="34" charset="0"/>
                         </a:rPr>
                         <a:t>0.26749883</a:t>
                       </a:r>
+                      <a:endParaRPr lang="en-GB" sz="1400" b="0" i="0" u="none" strike="noStrike">
+                        <a:solidFill>
+                          <a:srgbClr val="000000"/>
+                        </a:solidFill>
+                        <a:effectLst/>
+                        <a:latin typeface="Calibri" panose="020F0502020204030204" pitchFamily="34" charset="0"/>
+                      </a:endParaRPr>
                     </a:p>
                   </a:txBody>
-                  <a:tcPr marL="9359" marR="9359" marT="9359" marB="0" anchor="b">
-                    <a:lnL>
-                      <a:noFill/>
-                    </a:lnL>
-                    <a:lnR>
-                      <a:noFill/>
-                    </a:lnR>
-                    <a:lnT>
-                      <a:noFill/>
-                    </a:lnT>
-                    <a:lnB>
-                      <a:noFill/>
-                    </a:lnB>
-                  </a:tcPr>
+                  <a:tcPr marL="9359" marR="9359" marT="9359" marB="0" anchor="b"/>
                 </a:tc>
                 <a:extLst>
                   <a:ext uri="{0D108BD9-81ED-4DB2-BD59-A6C34878D82A}">
@@ -17668,31 +17460,24 @@
                     <a:p>
                       <a:pPr algn="r" fontAlgn="b"/>
                       <a:r>
-                        <a:rPr lang="en-GB" sz="1400" b="0" i="0" u="none" strike="noStrike">
+                        <a:rPr lang="en-GB" sz="1400" b="0" u="none" strike="noStrike">
                           <a:solidFill>
                             <a:srgbClr val="000000"/>
                           </a:solidFill>
                           <a:effectLst/>
-                          <a:latin typeface="Calibri" panose="020F0502020204030204" pitchFamily="34" charset="0"/>
                         </a:rPr>
                         <a:t>1.4</a:t>
                       </a:r>
+                      <a:endParaRPr lang="en-GB" sz="1400" b="0" i="0" u="none" strike="noStrike">
+                        <a:solidFill>
+                          <a:srgbClr val="000000"/>
+                        </a:solidFill>
+                        <a:effectLst/>
+                        <a:latin typeface="Calibri" panose="020F0502020204030204" pitchFamily="34" charset="0"/>
+                      </a:endParaRPr>
                     </a:p>
                   </a:txBody>
-                  <a:tcPr marL="9359" marR="9359" marT="9359" marB="0" anchor="b">
-                    <a:lnL>
-                      <a:noFill/>
-                    </a:lnL>
-                    <a:lnR>
-                      <a:noFill/>
-                    </a:lnR>
-                    <a:lnT>
-                      <a:noFill/>
-                    </a:lnT>
-                    <a:lnB>
-                      <a:noFill/>
-                    </a:lnB>
-                  </a:tcPr>
+                  <a:tcPr marL="9359" marR="9359" marT="9359" marB="0" anchor="b"/>
                 </a:tc>
                 <a:tc>
                   <a:txBody>
@@ -17701,31 +17486,24 @@
                     <a:p>
                       <a:pPr algn="r" fontAlgn="b"/>
                       <a:r>
-                        <a:rPr lang="en-GB" sz="1400" b="0" i="0" u="none" strike="noStrike">
+                        <a:rPr lang="en-GB" sz="1400" b="0" u="none" strike="noStrike">
                           <a:solidFill>
                             <a:srgbClr val="000000"/>
                           </a:solidFill>
                           <a:effectLst/>
-                          <a:latin typeface="Calibri" panose="020F0502020204030204" pitchFamily="34" charset="0"/>
                         </a:rPr>
                         <a:t>0.16996714</a:t>
                       </a:r>
+                      <a:endParaRPr lang="en-GB" sz="1400" b="0" i="0" u="none" strike="noStrike">
+                        <a:solidFill>
+                          <a:srgbClr val="000000"/>
+                        </a:solidFill>
+                        <a:effectLst/>
+                        <a:latin typeface="Calibri" panose="020F0502020204030204" pitchFamily="34" charset="0"/>
+                      </a:endParaRPr>
                     </a:p>
                   </a:txBody>
-                  <a:tcPr marL="9359" marR="9359" marT="9359" marB="0" anchor="b">
-                    <a:lnL>
-                      <a:noFill/>
-                    </a:lnL>
-                    <a:lnR>
-                      <a:noFill/>
-                    </a:lnR>
-                    <a:lnT>
-                      <a:noFill/>
-                    </a:lnT>
-                    <a:lnB>
-                      <a:noFill/>
-                    </a:lnB>
-                  </a:tcPr>
+                  <a:tcPr marL="9359" marR="9359" marT="9359" marB="0" anchor="b"/>
                 </a:tc>
                 <a:extLst>
                   <a:ext uri="{0D108BD9-81ED-4DB2-BD59-A6C34878D82A}">
@@ -17741,31 +17519,24 @@
                     <a:p>
                       <a:pPr algn="r" fontAlgn="b"/>
                       <a:r>
-                        <a:rPr lang="en-GB" sz="1400" b="0" i="0" u="none" strike="noStrike">
+                        <a:rPr lang="en-GB" sz="1400" b="0" u="none" strike="noStrike">
                           <a:solidFill>
                             <a:srgbClr val="000000"/>
                           </a:solidFill>
                           <a:effectLst/>
-                          <a:latin typeface="Calibri" panose="020F0502020204030204" pitchFamily="34" charset="0"/>
                         </a:rPr>
                         <a:t>1.5</a:t>
                       </a:r>
+                      <a:endParaRPr lang="en-GB" sz="1400" b="0" i="0" u="none" strike="noStrike">
+                        <a:solidFill>
+                          <a:srgbClr val="000000"/>
+                        </a:solidFill>
+                        <a:effectLst/>
+                        <a:latin typeface="Calibri" panose="020F0502020204030204" pitchFamily="34" charset="0"/>
+                      </a:endParaRPr>
                     </a:p>
                   </a:txBody>
-                  <a:tcPr marL="9359" marR="9359" marT="9359" marB="0" anchor="b">
-                    <a:lnL>
-                      <a:noFill/>
-                    </a:lnL>
-                    <a:lnR>
-                      <a:noFill/>
-                    </a:lnR>
-                    <a:lnT>
-                      <a:noFill/>
-                    </a:lnT>
-                    <a:lnB>
-                      <a:noFill/>
-                    </a:lnB>
-                  </a:tcPr>
+                  <a:tcPr marL="9359" marR="9359" marT="9359" marB="0" anchor="b"/>
                 </a:tc>
                 <a:tc>
                   <a:txBody>
@@ -17774,31 +17545,24 @@
                     <a:p>
                       <a:pPr algn="r" fontAlgn="b"/>
                       <a:r>
-                        <a:rPr lang="en-GB" sz="1400" b="0" i="0" u="none" strike="noStrike" dirty="0">
+                        <a:rPr lang="en-GB" sz="1400" b="0" u="none" strike="noStrike" dirty="0">
                           <a:solidFill>
                             <a:srgbClr val="000000"/>
                           </a:solidFill>
                           <a:effectLst/>
-                          <a:latin typeface="Calibri" panose="020F0502020204030204" pitchFamily="34" charset="0"/>
                         </a:rPr>
                         <a:t>0.0707372</a:t>
                       </a:r>
+                      <a:endParaRPr lang="en-GB" sz="1400" b="0" i="0" u="none" strike="noStrike" dirty="0">
+                        <a:solidFill>
+                          <a:srgbClr val="000000"/>
+                        </a:solidFill>
+                        <a:effectLst/>
+                        <a:latin typeface="Calibri" panose="020F0502020204030204" pitchFamily="34" charset="0"/>
+                      </a:endParaRPr>
                     </a:p>
                   </a:txBody>
-                  <a:tcPr marL="9359" marR="9359" marT="9359" marB="0" anchor="b">
-                    <a:lnL>
-                      <a:noFill/>
-                    </a:lnL>
-                    <a:lnR>
-                      <a:noFill/>
-                    </a:lnR>
-                    <a:lnT>
-                      <a:noFill/>
-                    </a:lnT>
-                    <a:lnB>
-                      <a:noFill/>
-                    </a:lnB>
-                  </a:tcPr>
+                  <a:tcPr marL="9359" marR="9359" marT="9359" marB="0" anchor="b"/>
                 </a:tc>
                 <a:extLst>
                   <a:ext uri="{0D108BD9-81ED-4DB2-BD59-A6C34878D82A}">
@@ -18203,22 +17967,13 @@
             </a:r>
           </a:p>
           <a:p>
+            <a:pPr marL="288000" lvl="2" indent="0">
+              <a:buNone/>
+            </a:pPr>
+            <a:endParaRPr lang="en-GB" b="1" dirty="0"/>
+          </a:p>
+          <a:p>
             <a:pPr lvl="1"/>
-            <a:endParaRPr lang="en-GB" b="1" dirty="0"/>
-          </a:p>
-          <a:p>
-            <a:pPr lvl="1"/>
-            <a:r>
-              <a:rPr lang="en-GB" u="sng" dirty="0"/>
-              <a:t>Demo</a:t>
-            </a:r>
-            <a:r>
-              <a:rPr lang="en-GB" dirty="0"/>
-              <a:t>: installing python packages</a:t>
-            </a:r>
-          </a:p>
-          <a:p>
-            <a:pPr lvl="2"/>
             <a:r>
               <a:rPr lang="en-GB" dirty="0"/>
               <a:t>If you don’t have root permissions use </a:t>
@@ -18376,6 +18131,36 @@
           </p:txBody>
         </p:sp>
       </p:grpSp>
+      <p:pic>
+        <p:nvPicPr>
+          <p:cNvPr id="9" name="Picture 8">
+            <a:extLst>
+              <a:ext uri="{FF2B5EF4-FFF2-40B4-BE49-F238E27FC236}">
+                <a16:creationId xmlns:a16="http://schemas.microsoft.com/office/drawing/2014/main" id="{3323EA3D-DC34-EA49-BD4F-C8B9B78AD939}"/>
+              </a:ext>
+            </a:extLst>
+          </p:cNvPr>
+          <p:cNvPicPr>
+            <a:picLocks noChangeAspect="1"/>
+          </p:cNvPicPr>
+          <p:nvPr/>
+        </p:nvPicPr>
+        <p:blipFill>
+          <a:blip r:embed="rId5"/>
+          <a:stretch>
+            <a:fillRect/>
+          </a:stretch>
+        </p:blipFill>
+        <p:spPr>
+          <a:xfrm>
+            <a:off x="1661111" y="4298808"/>
+            <a:ext cx="6193883" cy="512522"/>
+          </a:xfrm>
+          <a:prstGeom prst="rect">
+            <a:avLst/>
+          </a:prstGeom>
+        </p:spPr>
+      </p:pic>
     </p:spTree>
     <p:extLst>
       <p:ext uri="{BB962C8B-B14F-4D97-AF65-F5344CB8AC3E}">
@@ -24037,10 +23822,10 @@
       </p:grpSp>
       <p:pic>
         <p:nvPicPr>
-          <p:cNvPr id="10" name="Picture 9">
+          <p:cNvPr id="13" name="Picture 12">
             <a:extLst>
               <a:ext uri="{FF2B5EF4-FFF2-40B4-BE49-F238E27FC236}">
-                <a16:creationId xmlns:a16="http://schemas.microsoft.com/office/drawing/2014/main" id="{9826856B-F158-B046-8627-1EE099741DC1}"/>
+                <a16:creationId xmlns:a16="http://schemas.microsoft.com/office/drawing/2014/main" id="{D05E0E4F-C155-B046-AE21-52769EA88E1A}"/>
               </a:ext>
             </a:extLst>
           </p:cNvPr>
@@ -24057,8 +23842,8 @@
         </p:blipFill>
         <p:spPr>
           <a:xfrm>
-            <a:off x="5237767" y="1458047"/>
-            <a:ext cx="3708400" cy="1003300"/>
+            <a:off x="1581266" y="3297345"/>
+            <a:ext cx="5283200" cy="1676400"/>
           </a:xfrm>
           <a:prstGeom prst="rect">
             <a:avLst/>
@@ -24067,10 +23852,10 @@
       </p:pic>
       <p:pic>
         <p:nvPicPr>
-          <p:cNvPr id="13" name="Picture 12">
+          <p:cNvPr id="15" name="Picture 14">
             <a:extLst>
               <a:ext uri="{FF2B5EF4-FFF2-40B4-BE49-F238E27FC236}">
-                <a16:creationId xmlns:a16="http://schemas.microsoft.com/office/drawing/2014/main" id="{D05E0E4F-C155-B046-AE21-52769EA88E1A}"/>
+                <a16:creationId xmlns:a16="http://schemas.microsoft.com/office/drawing/2014/main" id="{51D41353-8B04-B348-8E84-BDA7C306E8E0}"/>
               </a:ext>
             </a:extLst>
           </p:cNvPr>
@@ -24087,8 +23872,8 @@
         </p:blipFill>
         <p:spPr>
           <a:xfrm>
-            <a:off x="1581266" y="3297345"/>
-            <a:ext cx="5283200" cy="1676400"/>
+            <a:off x="5398741" y="977502"/>
+            <a:ext cx="3644900" cy="1320800"/>
           </a:xfrm>
           <a:prstGeom prst="rect">
             <a:avLst/>

</xml_diff>

<commit_message>
Update slides for March class
</commit_message>
<xml_diff>
--- a/slides/intermediate_python.pptx
+++ b/slides/intermediate_python.pptx
@@ -260,7 +260,7 @@
           <a:p>
             <a:fld id="{3C5ACD56-CA7D-3A42-9B42-9FD56464B91C}" type="datetimeFigureOut">
               <a:rPr lang="en-US" smtClean="0"/>
-              <a:t>11/23/21</a:t>
+              <a:t>3/9/22</a:t>
             </a:fld>
             <a:endParaRPr lang="en-US"/>
           </a:p>
@@ -485,7 +485,7 @@
           <a:p>
             <a:fld id="{FEC2AC38-C1E7-D047-A0EE-6A60B29092BF}" type="datetimeFigureOut">
               <a:rPr lang="en-US" smtClean="0"/>
-              <a:t>11/23/21</a:t>
+              <a:t>3/9/22</a:t>
             </a:fld>
             <a:endParaRPr lang="en-US"/>
           </a:p>
@@ -7109,7 +7109,7 @@
           <a:p>
             <a:fld id="{E05189BA-01D0-0648-AF2A-6B4CD6B57EC9}" type="datetimeFigureOut">
               <a:rPr lang="en-US" smtClean="0"/>
-              <a:t>11/23/21</a:t>
+              <a:t>3/9/22</a:t>
             </a:fld>
             <a:endParaRPr lang="en-US"/>
           </a:p>
@@ -7544,7 +7544,7 @@
           <a:p>
             <a:r>
               <a:rPr lang="en-US" sz="1400" dirty="0"/>
-              <a:t>November 25, 2021</a:t>
+              <a:t>March 10, 2022</a:t>
             </a:r>
           </a:p>
         </p:txBody>
@@ -24842,57 +24842,6 @@
 </file>
 
 <file path=customXml/item1.xml><?xml version="1.0" encoding="utf-8"?>
-<p:properties xmlns:p="http://schemas.microsoft.com/office/2006/metadata/properties" xmlns:xsi="http://www.w3.org/2001/XMLSchema-instance" xmlns:pc="http://schemas.microsoft.com/office/infopath/2007/PartnerControls">
-  <documentManagement>
-    <DefaultSectionNames xmlns="674d51e3-3ba6-45e1-9e5a-18c440d6de5a" xsi:nil="true"/>
-    <NotebookType xmlns="674d51e3-3ba6-45e1-9e5a-18c440d6de5a" xsi:nil="true"/>
-    <Owner xmlns="674d51e3-3ba6-45e1-9e5a-18c440d6de5a">
-      <UserInfo>
-        <DisplayName/>
-        <AccountId xsi:nil="true"/>
-        <AccountType/>
-      </UserInfo>
-    </Owner>
-    <Math_Settings xmlns="674d51e3-3ba6-45e1-9e5a-18c440d6de5a" xsi:nil="true"/>
-    <Is_Collaboration_Space_Locked xmlns="674d51e3-3ba6-45e1-9e5a-18c440d6de5a" xsi:nil="true"/>
-    <FolderType xmlns="674d51e3-3ba6-45e1-9e5a-18c440d6de5a" xsi:nil="true"/>
-    <Leaders xmlns="674d51e3-3ba6-45e1-9e5a-18c440d6de5a">
-      <UserInfo>
-        <DisplayName/>
-        <AccountId xsi:nil="true"/>
-        <AccountType/>
-      </UserInfo>
-    </Leaders>
-    <Invited_Members xmlns="674d51e3-3ba6-45e1-9e5a-18c440d6de5a" xsi:nil="true"/>
-    <TeamsChannelId xmlns="674d51e3-3ba6-45e1-9e5a-18c440d6de5a" xsi:nil="true"/>
-    <Invited_Leaders xmlns="674d51e3-3ba6-45e1-9e5a-18c440d6de5a" xsi:nil="true"/>
-    <IsNotebookLocked xmlns="674d51e3-3ba6-45e1-9e5a-18c440d6de5a" xsi:nil="true"/>
-    <Templates xmlns="674d51e3-3ba6-45e1-9e5a-18c440d6de5a" xsi:nil="true"/>
-    <Members xmlns="674d51e3-3ba6-45e1-9e5a-18c440d6de5a">
-      <UserInfo>
-        <DisplayName/>
-        <AccountId xsi:nil="true"/>
-        <AccountType/>
-      </UserInfo>
-    </Members>
-    <Member_Groups xmlns="674d51e3-3ba6-45e1-9e5a-18c440d6de5a">
-      <UserInfo>
-        <DisplayName/>
-        <AccountId xsi:nil="true"/>
-        <AccountType/>
-      </UserInfo>
-    </Member_Groups>
-    <Has_Leaders_Only_SectionGroup xmlns="674d51e3-3ba6-45e1-9e5a-18c440d6de5a" xsi:nil="true"/>
-    <AppVersion xmlns="674d51e3-3ba6-45e1-9e5a-18c440d6de5a" xsi:nil="true"/>
-    <LMS_Mappings xmlns="674d51e3-3ba6-45e1-9e5a-18c440d6de5a" xsi:nil="true"/>
-    <CultureName xmlns="674d51e3-3ba6-45e1-9e5a-18c440d6de5a" xsi:nil="true"/>
-    <Distribution_Groups xmlns="674d51e3-3ba6-45e1-9e5a-18c440d6de5a" xsi:nil="true"/>
-    <Self_Registration_Enabled xmlns="674d51e3-3ba6-45e1-9e5a-18c440d6de5a" xsi:nil="true"/>
-  </documentManagement>
-</p:properties>
-</file>
-
-<file path=customXml/item2.xml><?xml version="1.0" encoding="utf-8"?>
 <ct:contentTypeSchema xmlns:ct="http://schemas.microsoft.com/office/2006/metadata/contentType" xmlns:ma="http://schemas.microsoft.com/office/2006/metadata/properties/metaAttributes" ct:_="" ma:_="" ma:contentTypeName="Document" ma:contentTypeID="0x0101003BCE951B1D604F47AD4EB98F3F9810DA" ma:contentTypeVersion="32" ma:contentTypeDescription="Create a new document." ma:contentTypeScope="" ma:versionID="23952c7b5558240b611e31687aa23f46">
   <xsd:schema xmlns:xsd="http://www.w3.org/2001/XMLSchema" xmlns:xs="http://www.w3.org/2001/XMLSchema" xmlns:p="http://schemas.microsoft.com/office/2006/metadata/properties" xmlns:ns2="674d51e3-3ba6-45e1-9e5a-18c440d6de5a" xmlns:ns3="8f612c8a-2dfb-4a1a-9050-5ffbd886e57b" targetNamespace="http://schemas.microsoft.com/office/2006/metadata/properties" ma:root="true" ma:fieldsID="66abe757d0bdb80ac562d652a74b9128" ns2:_="" ns3:_="">
     <xsd:import namespace="674d51e3-3ba6-45e1-9e5a-18c440d6de5a"/>
@@ -25297,7 +25246,7 @@
 </ct:contentTypeSchema>
 </file>
 
-<file path=customXml/item3.xml><?xml version="1.0" encoding="utf-8"?>
+<file path=customXml/item2.xml><?xml version="1.0" encoding="utf-8"?>
 <?mso-contentType ?>
 <FormTemplates xmlns="http://schemas.microsoft.com/sharepoint/v3/contenttype/forms">
   <Display>DocumentLibraryForm</Display>
@@ -25306,17 +25255,58 @@
 </FormTemplates>
 </file>
 
-<file path=customXml/itemProps1.xml><?xml version="1.0" encoding="utf-8"?>
-<ds:datastoreItem xmlns:ds="http://schemas.openxmlformats.org/officeDocument/2006/customXml" ds:itemID="{AF8DFD8C-C4E6-4AFD-AFFE-5DE917C53F3C}">
-  <ds:schemaRefs>
-    <ds:schemaRef ds:uri="http://schemas.microsoft.com/office/2006/metadata/properties"/>
-    <ds:schemaRef ds:uri="http://schemas.microsoft.com/office/infopath/2007/PartnerControls"/>
-    <ds:schemaRef ds:uri="674d51e3-3ba6-45e1-9e5a-18c440d6de5a"/>
-  </ds:schemaRefs>
-</ds:datastoreItem>
+<file path=customXml/item3.xml><?xml version="1.0" encoding="utf-8"?>
+<p:properties xmlns:p="http://schemas.microsoft.com/office/2006/metadata/properties" xmlns:xsi="http://www.w3.org/2001/XMLSchema-instance" xmlns:pc="http://schemas.microsoft.com/office/infopath/2007/PartnerControls">
+  <documentManagement>
+    <DefaultSectionNames xmlns="674d51e3-3ba6-45e1-9e5a-18c440d6de5a" xsi:nil="true"/>
+    <NotebookType xmlns="674d51e3-3ba6-45e1-9e5a-18c440d6de5a" xsi:nil="true"/>
+    <Owner xmlns="674d51e3-3ba6-45e1-9e5a-18c440d6de5a">
+      <UserInfo>
+        <DisplayName/>
+        <AccountId xsi:nil="true"/>
+        <AccountType/>
+      </UserInfo>
+    </Owner>
+    <Math_Settings xmlns="674d51e3-3ba6-45e1-9e5a-18c440d6de5a" xsi:nil="true"/>
+    <Is_Collaboration_Space_Locked xmlns="674d51e3-3ba6-45e1-9e5a-18c440d6de5a" xsi:nil="true"/>
+    <FolderType xmlns="674d51e3-3ba6-45e1-9e5a-18c440d6de5a" xsi:nil="true"/>
+    <Leaders xmlns="674d51e3-3ba6-45e1-9e5a-18c440d6de5a">
+      <UserInfo>
+        <DisplayName/>
+        <AccountId xsi:nil="true"/>
+        <AccountType/>
+      </UserInfo>
+    </Leaders>
+    <Invited_Members xmlns="674d51e3-3ba6-45e1-9e5a-18c440d6de5a" xsi:nil="true"/>
+    <TeamsChannelId xmlns="674d51e3-3ba6-45e1-9e5a-18c440d6de5a" xsi:nil="true"/>
+    <Invited_Leaders xmlns="674d51e3-3ba6-45e1-9e5a-18c440d6de5a" xsi:nil="true"/>
+    <IsNotebookLocked xmlns="674d51e3-3ba6-45e1-9e5a-18c440d6de5a" xsi:nil="true"/>
+    <Templates xmlns="674d51e3-3ba6-45e1-9e5a-18c440d6de5a" xsi:nil="true"/>
+    <Members xmlns="674d51e3-3ba6-45e1-9e5a-18c440d6de5a">
+      <UserInfo>
+        <DisplayName/>
+        <AccountId xsi:nil="true"/>
+        <AccountType/>
+      </UserInfo>
+    </Members>
+    <Member_Groups xmlns="674d51e3-3ba6-45e1-9e5a-18c440d6de5a">
+      <UserInfo>
+        <DisplayName/>
+        <AccountId xsi:nil="true"/>
+        <AccountType/>
+      </UserInfo>
+    </Member_Groups>
+    <Has_Leaders_Only_SectionGroup xmlns="674d51e3-3ba6-45e1-9e5a-18c440d6de5a" xsi:nil="true"/>
+    <AppVersion xmlns="674d51e3-3ba6-45e1-9e5a-18c440d6de5a" xsi:nil="true"/>
+    <LMS_Mappings xmlns="674d51e3-3ba6-45e1-9e5a-18c440d6de5a" xsi:nil="true"/>
+    <CultureName xmlns="674d51e3-3ba6-45e1-9e5a-18c440d6de5a" xsi:nil="true"/>
+    <Distribution_Groups xmlns="674d51e3-3ba6-45e1-9e5a-18c440d6de5a" xsi:nil="true"/>
+    <Self_Registration_Enabled xmlns="674d51e3-3ba6-45e1-9e5a-18c440d6de5a" xsi:nil="true"/>
+  </documentManagement>
+</p:properties>
 </file>
 
-<file path=customXml/itemProps2.xml><?xml version="1.0" encoding="utf-8"?>
+<file path=customXml/itemProps1.xml><?xml version="1.0" encoding="utf-8"?>
 <ds:datastoreItem xmlns:ds="http://schemas.openxmlformats.org/officeDocument/2006/customXml" ds:itemID="{1B41EC66-195F-4287-BC41-3B0E6575772B}">
   <ds:schemaRefs>
     <ds:schemaRef ds:uri="http://schemas.microsoft.com/office/2006/metadata/contentType"/>
@@ -25335,10 +25325,20 @@
 </ds:datastoreItem>
 </file>
 
-<file path=customXml/itemProps3.xml><?xml version="1.0" encoding="utf-8"?>
+<file path=customXml/itemProps2.xml><?xml version="1.0" encoding="utf-8"?>
 <ds:datastoreItem xmlns:ds="http://schemas.openxmlformats.org/officeDocument/2006/customXml" ds:itemID="{03D31AFE-7852-4A45-A705-FCC8674A4480}">
   <ds:schemaRefs>
     <ds:schemaRef ds:uri="http://schemas.microsoft.com/sharepoint/v3/contenttype/forms"/>
   </ds:schemaRefs>
 </ds:datastoreItem>
+</file>
+
+<file path=customXml/itemProps3.xml><?xml version="1.0" encoding="utf-8"?>
+<ds:datastoreItem xmlns:ds="http://schemas.openxmlformats.org/officeDocument/2006/customXml" ds:itemID="{AF8DFD8C-C4E6-4AFD-AFFE-5DE917C53F3C}">
+  <ds:schemaRefs>
+    <ds:schemaRef ds:uri="http://schemas.microsoft.com/office/2006/metadata/properties"/>
+    <ds:schemaRef ds:uri="http://schemas.microsoft.com/office/infopath/2007/PartnerControls"/>
+    <ds:schemaRef ds:uri="674d51e3-3ba6-45e1-9e5a-18c440d6de5a"/>
+  </ds:schemaRefs>
+</ds:datastoreItem>
 </file>
</xml_diff>